<commit_message>
Update to last powerpoint
</commit_message>
<xml_diff>
--- a/Documentation/Demo 3.pptx
+++ b/Documentation/Demo 3.pptx
@@ -9,6 +9,9 @@
     <p:sldId id="257" r:id="rId3"/>
     <p:sldId id="260" r:id="rId4"/>
     <p:sldId id="259" r:id="rId5"/>
+    <p:sldId id="263" r:id="rId6"/>
+    <p:sldId id="262" r:id="rId7"/>
+    <p:sldId id="261" r:id="rId8"/>
   </p:sldIdLst>
   <p:sldSz cx="12192000" cy="6858000"/>
   <p:notesSz cx="6858000" cy="9144000"/>
@@ -109,7 +112,18 @@
   </p:defaultTextStyle>
   <p:extLst>
     <p:ext uri="{EFAFB233-063F-42B5-8137-9DF3F51BA10A}">
-      <p15:sldGuideLst xmlns="" xmlns:p15="http://schemas.microsoft.com/office/powerpoint/2012/main"/>
+      <p15:sldGuideLst xmlns:p15="http://schemas.microsoft.com/office/powerpoint/2012/main">
+        <p15:guide id="1" orient="horz" pos="2160">
+          <p15:clr>
+            <a:srgbClr val="A4A3A4"/>
+          </p15:clr>
+        </p15:guide>
+        <p15:guide id="2" pos="3840">
+          <p15:clr>
+            <a:srgbClr val="A4A3A4"/>
+          </p15:clr>
+        </p15:guide>
+      </p15:sldGuideLst>
     </p:ext>
   </p:extLst>
 </p:presentation>
@@ -838,7 +852,7 @@
             <a:fld id="{B61BEF0D-F0BB-DE4B-95CE-6DB70DBA9567}" type="datetimeFigureOut">
               <a:rPr lang="en-US" dirty="0"/>
               <a:pPr/>
-              <a:t>9/18/2014</a:t>
+              <a:t>9/29/2014</a:t>
             </a:fld>
             <a:endParaRPr lang="en-US" dirty="0"/>
           </a:p>
@@ -1086,7 +1100,7 @@
             <a:fld id="{B61BEF0D-F0BB-DE4B-95CE-6DB70DBA9567}" type="datetimeFigureOut">
               <a:rPr lang="en-US" dirty="0"/>
               <a:pPr/>
-              <a:t>9/18/2014</a:t>
+              <a:t>9/29/2014</a:t>
             </a:fld>
             <a:endParaRPr lang="en-US" dirty="0"/>
           </a:p>
@@ -1397,7 +1411,7 @@
             <a:fld id="{B61BEF0D-F0BB-DE4B-95CE-6DB70DBA9567}" type="datetimeFigureOut">
               <a:rPr lang="en-US" dirty="0"/>
               <a:pPr/>
-              <a:t>9/18/2014</a:t>
+              <a:t>9/29/2014</a:t>
             </a:fld>
             <a:endParaRPr lang="en-US" dirty="0"/>
           </a:p>
@@ -1735,7 +1749,7 @@
             <a:fld id="{B61BEF0D-F0BB-DE4B-95CE-6DB70DBA9567}" type="datetimeFigureOut">
               <a:rPr lang="en-US" dirty="0"/>
               <a:pPr/>
-              <a:t>9/18/2014</a:t>
+              <a:t>9/29/2014</a:t>
             </a:fld>
             <a:endParaRPr lang="en-US" dirty="0"/>
           </a:p>
@@ -2046,7 +2060,7 @@
             <a:fld id="{B61BEF0D-F0BB-DE4B-95CE-6DB70DBA9567}" type="datetimeFigureOut">
               <a:rPr lang="en-US" dirty="0"/>
               <a:pPr/>
-              <a:t>9/18/2014</a:t>
+              <a:t>9/29/2014</a:t>
             </a:fld>
             <a:endParaRPr lang="en-US" dirty="0"/>
           </a:p>
@@ -2436,7 +2450,7 @@
             <a:fld id="{B61BEF0D-F0BB-DE4B-95CE-6DB70DBA9567}" type="datetimeFigureOut">
               <a:rPr lang="en-US" dirty="0"/>
               <a:pPr/>
-              <a:t>9/18/2014</a:t>
+              <a:t>9/29/2014</a:t>
             </a:fld>
             <a:endParaRPr lang="en-US" dirty="0"/>
           </a:p>
@@ -2602,7 +2616,7 @@
           <a:p>
             <a:fld id="{55C6B4A9-1611-4792-9094-5F34BCA07E0B}" type="datetimeFigureOut">
               <a:rPr lang="en-US" dirty="0"/>
-              <a:t>9/18/2014</a:t>
+              <a:t>9/29/2014</a:t>
             </a:fld>
             <a:endParaRPr lang="en-US" dirty="0"/>
           </a:p>
@@ -2778,7 +2792,7 @@
             <a:fld id="{B61BEF0D-F0BB-DE4B-95CE-6DB70DBA9567}" type="datetimeFigureOut">
               <a:rPr lang="en-US" dirty="0"/>
               <a:pPr/>
-              <a:t>9/18/2014</a:t>
+              <a:t>9/29/2014</a:t>
             </a:fld>
             <a:endParaRPr lang="en-US" dirty="0"/>
           </a:p>
@@ -2951,7 +2965,7 @@
             <a:fld id="{B61BEF0D-F0BB-DE4B-95CE-6DB70DBA9567}" type="datetimeFigureOut">
               <a:rPr lang="en-US" dirty="0"/>
               <a:pPr/>
-              <a:t>9/18/2014</a:t>
+              <a:t>9/29/2014</a:t>
             </a:fld>
             <a:endParaRPr lang="en-US" dirty="0"/>
           </a:p>
@@ -3195,7 +3209,7 @@
             <a:fld id="{B61BEF0D-F0BB-DE4B-95CE-6DB70DBA9567}" type="datetimeFigureOut">
               <a:rPr lang="en-US" dirty="0"/>
               <a:pPr/>
-              <a:t>9/18/2014</a:t>
+              <a:t>9/29/2014</a:t>
             </a:fld>
             <a:endParaRPr lang="en-US" dirty="0"/>
           </a:p>
@@ -3423,7 +3437,7 @@
           <a:p>
             <a:fld id="{EB712588-04B1-427B-82EE-E8DB90309F08}" type="datetimeFigureOut">
               <a:rPr lang="en-US" dirty="0"/>
-              <a:t>9/18/2014</a:t>
+              <a:t>9/29/2014</a:t>
             </a:fld>
             <a:endParaRPr lang="en-US" dirty="0"/>
           </a:p>
@@ -3793,7 +3807,7 @@
             <a:fld id="{B61BEF0D-F0BB-DE4B-95CE-6DB70DBA9567}" type="datetimeFigureOut">
               <a:rPr lang="en-US" dirty="0"/>
               <a:pPr/>
-              <a:t>9/18/2014</a:t>
+              <a:t>9/29/2014</a:t>
             </a:fld>
             <a:endParaRPr lang="en-US" dirty="0"/>
           </a:p>
@@ -3913,7 +3927,7 @@
             <a:fld id="{B61BEF0D-F0BB-DE4B-95CE-6DB70DBA9567}" type="datetimeFigureOut">
               <a:rPr lang="en-US" dirty="0"/>
               <a:pPr/>
-              <a:t>9/18/2014</a:t>
+              <a:t>9/29/2014</a:t>
             </a:fld>
             <a:endParaRPr lang="en-US" dirty="0"/>
           </a:p>
@@ -4005,7 +4019,7 @@
             <a:fld id="{B61BEF0D-F0BB-DE4B-95CE-6DB70DBA9567}" type="datetimeFigureOut">
               <a:rPr lang="en-US" dirty="0"/>
               <a:pPr/>
-              <a:t>9/18/2014</a:t>
+              <a:t>9/29/2014</a:t>
             </a:fld>
             <a:endParaRPr lang="en-US" dirty="0"/>
           </a:p>
@@ -4256,7 +4270,7 @@
           <a:p>
             <a:fld id="{42A54C80-263E-416B-A8E0-580EDEADCBDC}" type="datetimeFigureOut">
               <a:rPr lang="en-US" dirty="0"/>
-              <a:t>9/18/2014</a:t>
+              <a:t>9/29/2014</a:t>
             </a:fld>
             <a:endParaRPr lang="en-US" dirty="0"/>
           </a:p>
@@ -4515,7 +4529,7 @@
             <a:fld id="{B61BEF0D-F0BB-DE4B-95CE-6DB70DBA9567}" type="datetimeFigureOut">
               <a:rPr lang="en-US" dirty="0"/>
               <a:pPr/>
-              <a:t>9/18/2014</a:t>
+              <a:t>9/29/2014</a:t>
             </a:fld>
             <a:endParaRPr lang="en-US" dirty="0"/>
           </a:p>
@@ -5255,7 +5269,7 @@
             <a:fld id="{B61BEF0D-F0BB-DE4B-95CE-6DB70DBA9567}" type="datetimeFigureOut">
               <a:rPr lang="en-US" dirty="0"/>
               <a:pPr/>
-              <a:t>9/18/2014</a:t>
+              <a:t>9/29/2014</a:t>
             </a:fld>
             <a:endParaRPr lang="en-US" dirty="0"/>
           </a:p>
@@ -5817,7 +5831,6 @@
               <a:rPr lang="en-US" dirty="0" smtClean="0"/>
               <a:t>Models and Design</a:t>
             </a:r>
-            <a:endParaRPr lang="en-US" dirty="0" smtClean="0"/>
           </a:p>
         </p:txBody>
       </p:sp>
@@ -5908,17 +5921,7 @@
                   </a:schemeClr>
                 </a:solidFill>
               </a:rPr>
-              <a:t>29, </a:t>
-            </a:r>
-            <a:r>
-              <a:rPr lang="en-US" dirty="0" smtClean="0">
-                <a:solidFill>
-                  <a:schemeClr val="tx1">
-                    <a:alpha val="54000"/>
-                  </a:schemeClr>
-                </a:solidFill>
-              </a:rPr>
-              <a:t>September 2014</a:t>
+              <a:t>29, September 2014</a:t>
             </a:r>
             <a:endParaRPr lang="en-US" dirty="0">
               <a:solidFill>
@@ -5940,6 +5943,13 @@
   <p:clrMapOvr>
     <a:masterClrMapping/>
   </p:clrMapOvr>
+  <p:timing>
+    <p:tnLst>
+      <p:par>
+        <p:cTn id="1" dur="indefinite" restart="never" nodeType="tmRoot"/>
+      </p:par>
+    </p:tnLst>
+  </p:timing>
 </p:sld>
 </file>
 
@@ -6090,6 +6100,13 @@
   <p:clrMapOvr>
     <a:masterClrMapping/>
   </p:clrMapOvr>
+  <p:timing>
+    <p:tnLst>
+      <p:par>
+        <p:cTn id="1" dur="indefinite" restart="never" nodeType="tmRoot"/>
+      </p:par>
+    </p:tnLst>
+  </p:timing>
 </p:sld>
 </file>
 
@@ -6239,6 +6256,13 @@
   <p:clrMapOvr>
     <a:masterClrMapping/>
   </p:clrMapOvr>
+  <p:timing>
+    <p:tnLst>
+      <p:par>
+        <p:cTn id="1" dur="indefinite" restart="never" nodeType="tmRoot"/>
+      </p:par>
+    </p:tnLst>
+  </p:timing>
 </p:sld>
 </file>
 
@@ -6276,38 +6300,41 @@
           <a:p>
             <a:r>
               <a:rPr lang="en-US" dirty="0" smtClean="0"/>
-              <a:t>Design </a:t>
-            </a:r>
-            <a:r>
-              <a:rPr lang="en-US" dirty="0" smtClean="0"/>
-              <a:t>Choices</a:t>
-            </a:r>
-            <a:endParaRPr lang="en-US" dirty="0"/>
-          </a:p>
-        </p:txBody>
-      </p:sp>
-      <p:sp>
-        <p:nvSpPr>
-          <p:cNvPr id="3" name="Content Placeholder 2"/>
-          <p:cNvSpPr>
-            <a:spLocks noGrp="1"/>
-          </p:cNvSpPr>
+              <a:t>Main Screen</a:t>
+            </a:r>
+            <a:endParaRPr lang="en-US" dirty="0"/>
+          </a:p>
+        </p:txBody>
+      </p:sp>
+      <p:pic>
+        <p:nvPicPr>
+          <p:cNvPr id="5" name="Content Placeholder 4"/>
+          <p:cNvPicPr>
+            <a:picLocks noGrp="1" noChangeAspect="1"/>
+          </p:cNvPicPr>
           <p:nvPr>
             <p:ph idx="1"/>
           </p:nvPr>
-        </p:nvSpPr>
-        <p:spPr/>
-        <p:txBody>
-          <a:bodyPr/>
-          <a:lstStyle/>
-          <a:p>
-            <a:pPr marL="0" indent="0">
-              <a:buNone/>
-            </a:pPr>
-            <a:endParaRPr lang="en-US" dirty="0" smtClean="0"/>
-          </a:p>
-        </p:txBody>
-      </p:sp>
+        </p:nvPicPr>
+        <p:blipFill>
+          <a:blip r:embed="rId2">
+            <a:extLst>
+              <a:ext uri="{28A0092B-C50C-407E-A947-70E740481C1C}">
+                <a14:useLocalDpi xmlns:a14="http://schemas.microsoft.com/office/drawing/2010/main" val="0"/>
+              </a:ext>
+            </a:extLst>
+          </a:blip>
+          <a:stretch>
+            <a:fillRect/>
+          </a:stretch>
+        </p:blipFill>
+        <p:spPr>
+          <a:xfrm>
+            <a:off x="3985694" y="2160588"/>
+            <a:ext cx="1980650" cy="3881437"/>
+          </a:xfrm>
+        </p:spPr>
+      </p:pic>
       <p:sp>
         <p:nvSpPr>
           <p:cNvPr id="4" name="TextBox 3"/>
@@ -6348,6 +6375,280 @@
   <p:clrMapOvr>
     <a:masterClrMapping/>
   </p:clrMapOvr>
+  <p:timing>
+    <p:tnLst>
+      <p:par>
+        <p:cTn id="1" dur="indefinite" restart="never" nodeType="tmRoot"/>
+      </p:par>
+    </p:tnLst>
+  </p:timing>
+</p:sld>
+</file>
+
+<file path=ppt/slides/slide5.xml><?xml version="1.0" encoding="utf-8"?>
+<p:sld xmlns:a="http://schemas.openxmlformats.org/drawingml/2006/main" xmlns:r="http://schemas.openxmlformats.org/officeDocument/2006/relationships" xmlns:p="http://schemas.openxmlformats.org/presentationml/2006/main">
+  <p:cSld>
+    <p:spTree>
+      <p:nvGrpSpPr>
+        <p:cNvPr id="1" name=""/>
+        <p:cNvGrpSpPr/>
+        <p:nvPr/>
+      </p:nvGrpSpPr>
+      <p:grpSpPr>
+        <a:xfrm>
+          <a:off x="0" y="0"/>
+          <a:ext cx="0" cy="0"/>
+          <a:chOff x="0" y="0"/>
+          <a:chExt cx="0" cy="0"/>
+        </a:xfrm>
+      </p:grpSpPr>
+      <p:sp>
+        <p:nvSpPr>
+          <p:cNvPr id="2" name="Title 1"/>
+          <p:cNvSpPr>
+            <a:spLocks noGrp="1"/>
+          </p:cNvSpPr>
+          <p:nvPr>
+            <p:ph type="title"/>
+          </p:nvPr>
+        </p:nvSpPr>
+        <p:spPr/>
+        <p:txBody>
+          <a:bodyPr/>
+          <a:lstStyle/>
+          <a:p>
+            <a:r>
+              <a:rPr lang="en-US" dirty="0" smtClean="0"/>
+              <a:t>Character</a:t>
+            </a:r>
+            <a:endParaRPr lang="en-US" dirty="0"/>
+          </a:p>
+        </p:txBody>
+      </p:sp>
+      <p:pic>
+        <p:nvPicPr>
+          <p:cNvPr id="4" name="Content Placeholder 3"/>
+          <p:cNvPicPr>
+            <a:picLocks noGrp="1" noChangeAspect="1"/>
+          </p:cNvPicPr>
+          <p:nvPr>
+            <p:ph idx="1"/>
+          </p:nvPr>
+        </p:nvPicPr>
+        <p:blipFill>
+          <a:blip r:embed="rId2">
+            <a:extLst>
+              <a:ext uri="{28A0092B-C50C-407E-A947-70E740481C1C}">
+                <a14:useLocalDpi xmlns:a14="http://schemas.microsoft.com/office/drawing/2010/main" val="0"/>
+              </a:ext>
+            </a:extLst>
+          </a:blip>
+          <a:stretch>
+            <a:fillRect/>
+          </a:stretch>
+        </p:blipFill>
+        <p:spPr>
+          <a:xfrm>
+            <a:off x="3985694" y="2160588"/>
+            <a:ext cx="1980650" cy="3881437"/>
+          </a:xfrm>
+        </p:spPr>
+      </p:pic>
+    </p:spTree>
+    <p:extLst>
+      <p:ext uri="{BB962C8B-B14F-4D97-AF65-F5344CB8AC3E}">
+        <p14:creationId xmlns:p14="http://schemas.microsoft.com/office/powerpoint/2010/main" val="914436682"/>
+      </p:ext>
+    </p:extLst>
+  </p:cSld>
+  <p:clrMapOvr>
+    <a:masterClrMapping/>
+  </p:clrMapOvr>
+  <p:timing>
+    <p:tnLst>
+      <p:par>
+        <p:cTn id="1" dur="indefinite" restart="never" nodeType="tmRoot"/>
+      </p:par>
+    </p:tnLst>
+  </p:timing>
+</p:sld>
+</file>
+
+<file path=ppt/slides/slide6.xml><?xml version="1.0" encoding="utf-8"?>
+<p:sld xmlns:a="http://schemas.openxmlformats.org/drawingml/2006/main" xmlns:r="http://schemas.openxmlformats.org/officeDocument/2006/relationships" xmlns:p="http://schemas.openxmlformats.org/presentationml/2006/main">
+  <p:cSld>
+    <p:spTree>
+      <p:nvGrpSpPr>
+        <p:cNvPr id="1" name=""/>
+        <p:cNvGrpSpPr/>
+        <p:nvPr/>
+      </p:nvGrpSpPr>
+      <p:grpSpPr>
+        <a:xfrm>
+          <a:off x="0" y="0"/>
+          <a:ext cx="0" cy="0"/>
+          <a:chOff x="0" y="0"/>
+          <a:chExt cx="0" cy="0"/>
+        </a:xfrm>
+      </p:grpSpPr>
+      <p:sp>
+        <p:nvSpPr>
+          <p:cNvPr id="2" name="Title 1"/>
+          <p:cNvSpPr>
+            <a:spLocks noGrp="1"/>
+          </p:cNvSpPr>
+          <p:nvPr>
+            <p:ph type="title"/>
+          </p:nvPr>
+        </p:nvSpPr>
+        <p:spPr/>
+        <p:txBody>
+          <a:bodyPr/>
+          <a:lstStyle/>
+          <a:p>
+            <a:r>
+              <a:rPr lang="en-US" dirty="0" smtClean="0"/>
+              <a:t>Combat</a:t>
+            </a:r>
+            <a:endParaRPr lang="en-US" dirty="0"/>
+          </a:p>
+        </p:txBody>
+      </p:sp>
+      <p:pic>
+        <p:nvPicPr>
+          <p:cNvPr id="4" name="Content Placeholder 3"/>
+          <p:cNvPicPr>
+            <a:picLocks noGrp="1" noChangeAspect="1"/>
+          </p:cNvPicPr>
+          <p:nvPr>
+            <p:ph idx="1"/>
+          </p:nvPr>
+        </p:nvPicPr>
+        <p:blipFill>
+          <a:blip r:embed="rId2">
+            <a:extLst>
+              <a:ext uri="{28A0092B-C50C-407E-A947-70E740481C1C}">
+                <a14:useLocalDpi xmlns:a14="http://schemas.microsoft.com/office/drawing/2010/main" val="0"/>
+              </a:ext>
+            </a:extLst>
+          </a:blip>
+          <a:stretch>
+            <a:fillRect/>
+          </a:stretch>
+        </p:blipFill>
+        <p:spPr>
+          <a:xfrm>
+            <a:off x="3985694" y="2160588"/>
+            <a:ext cx="1980650" cy="3881437"/>
+          </a:xfrm>
+        </p:spPr>
+      </p:pic>
+    </p:spTree>
+    <p:extLst>
+      <p:ext uri="{BB962C8B-B14F-4D97-AF65-F5344CB8AC3E}">
+        <p14:creationId xmlns:p14="http://schemas.microsoft.com/office/powerpoint/2010/main" val="2022032238"/>
+      </p:ext>
+    </p:extLst>
+  </p:cSld>
+  <p:clrMapOvr>
+    <a:masterClrMapping/>
+  </p:clrMapOvr>
+  <p:timing>
+    <p:tnLst>
+      <p:par>
+        <p:cTn id="1" dur="indefinite" restart="never" nodeType="tmRoot"/>
+      </p:par>
+    </p:tnLst>
+  </p:timing>
+</p:sld>
+</file>
+
+<file path=ppt/slides/slide7.xml><?xml version="1.0" encoding="utf-8"?>
+<p:sld xmlns:a="http://schemas.openxmlformats.org/drawingml/2006/main" xmlns:r="http://schemas.openxmlformats.org/officeDocument/2006/relationships" xmlns:p="http://schemas.openxmlformats.org/presentationml/2006/main">
+  <p:cSld>
+    <p:spTree>
+      <p:nvGrpSpPr>
+        <p:cNvPr id="1" name=""/>
+        <p:cNvGrpSpPr/>
+        <p:nvPr/>
+      </p:nvGrpSpPr>
+      <p:grpSpPr>
+        <a:xfrm>
+          <a:off x="0" y="0"/>
+          <a:ext cx="0" cy="0"/>
+          <a:chOff x="0" y="0"/>
+          <a:chExt cx="0" cy="0"/>
+        </a:xfrm>
+      </p:grpSpPr>
+      <p:sp>
+        <p:nvSpPr>
+          <p:cNvPr id="2" name="Title 1"/>
+          <p:cNvSpPr>
+            <a:spLocks noGrp="1"/>
+          </p:cNvSpPr>
+          <p:nvPr>
+            <p:ph type="title"/>
+          </p:nvPr>
+        </p:nvSpPr>
+        <p:spPr/>
+        <p:txBody>
+          <a:bodyPr/>
+          <a:lstStyle/>
+          <a:p>
+            <a:r>
+              <a:rPr lang="en-US" dirty="0" smtClean="0"/>
+              <a:t>Skills</a:t>
+            </a:r>
+            <a:endParaRPr lang="en-US" dirty="0"/>
+          </a:p>
+        </p:txBody>
+      </p:sp>
+      <p:pic>
+        <p:nvPicPr>
+          <p:cNvPr id="4" name="Content Placeholder 3"/>
+          <p:cNvPicPr>
+            <a:picLocks noGrp="1" noChangeAspect="1"/>
+          </p:cNvPicPr>
+          <p:nvPr>
+            <p:ph idx="1"/>
+          </p:nvPr>
+        </p:nvPicPr>
+        <p:blipFill>
+          <a:blip r:embed="rId2">
+            <a:extLst>
+              <a:ext uri="{28A0092B-C50C-407E-A947-70E740481C1C}">
+                <a14:useLocalDpi xmlns:a14="http://schemas.microsoft.com/office/drawing/2010/main" val="0"/>
+              </a:ext>
+            </a:extLst>
+          </a:blip>
+          <a:stretch>
+            <a:fillRect/>
+          </a:stretch>
+        </p:blipFill>
+        <p:spPr>
+          <a:xfrm>
+            <a:off x="3985694" y="2160588"/>
+            <a:ext cx="1980650" cy="3881437"/>
+          </a:xfrm>
+        </p:spPr>
+      </p:pic>
+    </p:spTree>
+    <p:extLst>
+      <p:ext uri="{BB962C8B-B14F-4D97-AF65-F5344CB8AC3E}">
+        <p14:creationId xmlns:p14="http://schemas.microsoft.com/office/powerpoint/2010/main" val="774898497"/>
+      </p:ext>
+    </p:extLst>
+  </p:cSld>
+  <p:clrMapOvr>
+    <a:masterClrMapping/>
+  </p:clrMapOvr>
+  <p:timing>
+    <p:tnLst>
+      <p:par>
+        <p:cTn id="1" dur="indefinite" restart="never" nodeType="tmRoot"/>
+      </p:par>
+    </p:tnLst>
+  </p:timing>
 </p:sld>
 </file>
 
@@ -6602,7 +6903,7 @@
   <a:extraClrSchemeLst/>
   <a:extLst>
     <a:ext uri="{05A4C25C-085E-4340-85A3-A5531E510DB2}">
-      <thm15:themeFamily xmlns="" xmlns:thm15="http://schemas.microsoft.com/office/thememl/2012/main" name="Facet" id="{C0C680CD-088A-49FC-A102-D699147F32B2}" vid="{CFBC31BA-B70F-4F30-BCAA-4F3011E16C4D}"/>
+      <thm15:themeFamily xmlns:thm15="http://schemas.microsoft.com/office/thememl/2012/main" name="Facet" id="{C0C680CD-088A-49FC-A102-D699147F32B2}" vid="{CFBC31BA-B70F-4F30-BCAA-4F3011E16C4D}"/>
     </a:ext>
   </a:extLst>
 </a:theme>

</xml_diff>

<commit_message>
Demo 3 PPT update
</commit_message>
<xml_diff>
--- a/Documentation/Demo 3.pptx
+++ b/Documentation/Demo 3.pptx
@@ -112,7 +112,7 @@
   </p:defaultTextStyle>
   <p:extLst>
     <p:ext uri="{EFAFB233-063F-42B5-8137-9DF3F51BA10A}">
-      <p15:sldGuideLst xmlns:p15="http://schemas.microsoft.com/office/powerpoint/2012/main">
+      <p15:sldGuideLst xmlns:p15="http://schemas.microsoft.com/office/powerpoint/2012/main" xmlns="">
         <p15:guide id="1" orient="horz" pos="2160">
           <p15:clr>
             <a:srgbClr val="A4A3A4"/>
@@ -852,7 +852,7 @@
             <a:fld id="{B61BEF0D-F0BB-DE4B-95CE-6DB70DBA9567}" type="datetimeFigureOut">
               <a:rPr lang="en-US" dirty="0"/>
               <a:pPr/>
-              <a:t>9/29/2014</a:t>
+              <a:t>9/30/2014</a:t>
             </a:fld>
             <a:endParaRPr lang="en-US" dirty="0"/>
           </a:p>
@@ -1100,7 +1100,7 @@
             <a:fld id="{B61BEF0D-F0BB-DE4B-95CE-6DB70DBA9567}" type="datetimeFigureOut">
               <a:rPr lang="en-US" dirty="0"/>
               <a:pPr/>
-              <a:t>9/29/2014</a:t>
+              <a:t>9/30/2014</a:t>
             </a:fld>
             <a:endParaRPr lang="en-US" dirty="0"/>
           </a:p>
@@ -1411,7 +1411,7 @@
             <a:fld id="{B61BEF0D-F0BB-DE4B-95CE-6DB70DBA9567}" type="datetimeFigureOut">
               <a:rPr lang="en-US" dirty="0"/>
               <a:pPr/>
-              <a:t>9/29/2014</a:t>
+              <a:t>9/30/2014</a:t>
             </a:fld>
             <a:endParaRPr lang="en-US" dirty="0"/>
           </a:p>
@@ -1749,7 +1749,7 @@
             <a:fld id="{B61BEF0D-F0BB-DE4B-95CE-6DB70DBA9567}" type="datetimeFigureOut">
               <a:rPr lang="en-US" dirty="0"/>
               <a:pPr/>
-              <a:t>9/29/2014</a:t>
+              <a:t>9/30/2014</a:t>
             </a:fld>
             <a:endParaRPr lang="en-US" dirty="0"/>
           </a:p>
@@ -2060,7 +2060,7 @@
             <a:fld id="{B61BEF0D-F0BB-DE4B-95CE-6DB70DBA9567}" type="datetimeFigureOut">
               <a:rPr lang="en-US" dirty="0"/>
               <a:pPr/>
-              <a:t>9/29/2014</a:t>
+              <a:t>9/30/2014</a:t>
             </a:fld>
             <a:endParaRPr lang="en-US" dirty="0"/>
           </a:p>
@@ -2450,7 +2450,7 @@
             <a:fld id="{B61BEF0D-F0BB-DE4B-95CE-6DB70DBA9567}" type="datetimeFigureOut">
               <a:rPr lang="en-US" dirty="0"/>
               <a:pPr/>
-              <a:t>9/29/2014</a:t>
+              <a:t>9/30/2014</a:t>
             </a:fld>
             <a:endParaRPr lang="en-US" dirty="0"/>
           </a:p>
@@ -2616,7 +2616,7 @@
           <a:p>
             <a:fld id="{55C6B4A9-1611-4792-9094-5F34BCA07E0B}" type="datetimeFigureOut">
               <a:rPr lang="en-US" dirty="0"/>
-              <a:t>9/29/2014</a:t>
+              <a:t>9/30/2014</a:t>
             </a:fld>
             <a:endParaRPr lang="en-US" dirty="0"/>
           </a:p>
@@ -2792,7 +2792,7 @@
             <a:fld id="{B61BEF0D-F0BB-DE4B-95CE-6DB70DBA9567}" type="datetimeFigureOut">
               <a:rPr lang="en-US" dirty="0"/>
               <a:pPr/>
-              <a:t>9/29/2014</a:t>
+              <a:t>9/30/2014</a:t>
             </a:fld>
             <a:endParaRPr lang="en-US" dirty="0"/>
           </a:p>
@@ -2965,7 +2965,7 @@
             <a:fld id="{B61BEF0D-F0BB-DE4B-95CE-6DB70DBA9567}" type="datetimeFigureOut">
               <a:rPr lang="en-US" dirty="0"/>
               <a:pPr/>
-              <a:t>9/29/2014</a:t>
+              <a:t>9/30/2014</a:t>
             </a:fld>
             <a:endParaRPr lang="en-US" dirty="0"/>
           </a:p>
@@ -3209,7 +3209,7 @@
             <a:fld id="{B61BEF0D-F0BB-DE4B-95CE-6DB70DBA9567}" type="datetimeFigureOut">
               <a:rPr lang="en-US" dirty="0"/>
               <a:pPr/>
-              <a:t>9/29/2014</a:t>
+              <a:t>9/30/2014</a:t>
             </a:fld>
             <a:endParaRPr lang="en-US" dirty="0"/>
           </a:p>
@@ -3437,7 +3437,7 @@
           <a:p>
             <a:fld id="{EB712588-04B1-427B-82EE-E8DB90309F08}" type="datetimeFigureOut">
               <a:rPr lang="en-US" dirty="0"/>
-              <a:t>9/29/2014</a:t>
+              <a:t>9/30/2014</a:t>
             </a:fld>
             <a:endParaRPr lang="en-US" dirty="0"/>
           </a:p>
@@ -3807,7 +3807,7 @@
             <a:fld id="{B61BEF0D-F0BB-DE4B-95CE-6DB70DBA9567}" type="datetimeFigureOut">
               <a:rPr lang="en-US" dirty="0"/>
               <a:pPr/>
-              <a:t>9/29/2014</a:t>
+              <a:t>9/30/2014</a:t>
             </a:fld>
             <a:endParaRPr lang="en-US" dirty="0"/>
           </a:p>
@@ -3927,7 +3927,7 @@
             <a:fld id="{B61BEF0D-F0BB-DE4B-95CE-6DB70DBA9567}" type="datetimeFigureOut">
               <a:rPr lang="en-US" dirty="0"/>
               <a:pPr/>
-              <a:t>9/29/2014</a:t>
+              <a:t>9/30/2014</a:t>
             </a:fld>
             <a:endParaRPr lang="en-US" dirty="0"/>
           </a:p>
@@ -4019,7 +4019,7 @@
             <a:fld id="{B61BEF0D-F0BB-DE4B-95CE-6DB70DBA9567}" type="datetimeFigureOut">
               <a:rPr lang="en-US" dirty="0"/>
               <a:pPr/>
-              <a:t>9/29/2014</a:t>
+              <a:t>9/30/2014</a:t>
             </a:fld>
             <a:endParaRPr lang="en-US" dirty="0"/>
           </a:p>
@@ -4270,7 +4270,7 @@
           <a:p>
             <a:fld id="{42A54C80-263E-416B-A8E0-580EDEADCBDC}" type="datetimeFigureOut">
               <a:rPr lang="en-US" dirty="0"/>
-              <a:t>9/29/2014</a:t>
+              <a:t>9/30/2014</a:t>
             </a:fld>
             <a:endParaRPr lang="en-US" dirty="0"/>
           </a:p>
@@ -4529,7 +4529,7 @@
             <a:fld id="{B61BEF0D-F0BB-DE4B-95CE-6DB70DBA9567}" type="datetimeFigureOut">
               <a:rPr lang="en-US" dirty="0"/>
               <a:pPr/>
-              <a:t>9/29/2014</a:t>
+              <a:t>9/30/2014</a:t>
             </a:fld>
             <a:endParaRPr lang="en-US" dirty="0"/>
           </a:p>
@@ -5269,7 +5269,7 @@
             <a:fld id="{B61BEF0D-F0BB-DE4B-95CE-6DB70DBA9567}" type="datetimeFigureOut">
               <a:rPr lang="en-US" dirty="0"/>
               <a:pPr/>
-              <a:t>9/29/2014</a:t>
+              <a:t>9/30/2014</a:t>
             </a:fld>
             <a:endParaRPr lang="en-US" dirty="0"/>
           </a:p>
@@ -5921,7 +5921,27 @@
                   </a:schemeClr>
                 </a:solidFill>
               </a:rPr>
-              <a:t>29, September 2014</a:t>
+              <a:t>02</a:t>
+            </a:r>
+            <a:r>
+              <a:rPr lang="en-US" dirty="0" smtClean="0">
+                <a:solidFill>
+                  <a:schemeClr val="tx1">
+                    <a:alpha val="54000"/>
+                  </a:schemeClr>
+                </a:solidFill>
+              </a:rPr>
+              <a:t>, October </a:t>
+            </a:r>
+            <a:r>
+              <a:rPr lang="en-US" dirty="0" smtClean="0">
+                <a:solidFill>
+                  <a:schemeClr val="tx1">
+                    <a:alpha val="54000"/>
+                  </a:schemeClr>
+                </a:solidFill>
+              </a:rPr>
+              <a:t>2014</a:t>
             </a:r>
             <a:endParaRPr lang="en-US" dirty="0">
               <a:solidFill>
@@ -6330,8 +6350,8 @@
         </p:blipFill>
         <p:spPr>
           <a:xfrm>
-            <a:off x="3985694" y="2160588"/>
-            <a:ext cx="1980650" cy="3881437"/>
+            <a:off x="3985693" y="547324"/>
+            <a:ext cx="3031795" cy="5941344"/>
           </a:xfrm>
         </p:spPr>
       </p:pic>
@@ -6449,11 +6469,45 @@
         </p:blipFill>
         <p:spPr>
           <a:xfrm>
-            <a:off x="3985694" y="2160588"/>
-            <a:ext cx="1980650" cy="3881437"/>
+            <a:off x="3964428" y="525985"/>
+            <a:ext cx="3031795" cy="5941343"/>
           </a:xfrm>
         </p:spPr>
       </p:pic>
+      <p:sp>
+        <p:nvSpPr>
+          <p:cNvPr id="5" name="TextBox 4"/>
+          <p:cNvSpPr txBox="1"/>
+          <p:nvPr/>
+        </p:nvSpPr>
+        <p:spPr>
+          <a:xfrm>
+            <a:off x="471286" y="6488668"/>
+            <a:ext cx="1163305" cy="369332"/>
+          </a:xfrm>
+          <a:prstGeom prst="rect">
+            <a:avLst/>
+          </a:prstGeom>
+          <a:noFill/>
+        </p:spPr>
+        <p:txBody>
+          <a:bodyPr wrap="square" rtlCol="0">
+            <a:spAutoFit/>
+          </a:bodyPr>
+          <a:lstStyle/>
+          <a:p>
+            <a:r>
+              <a:rPr lang="en-US" dirty="0" smtClean="0"/>
+              <a:t>Slide </a:t>
+            </a:r>
+            <a:r>
+              <a:rPr lang="en-US" dirty="0" smtClean="0"/>
+              <a:t>6</a:t>
+            </a:r>
+            <a:endParaRPr lang="en-US" dirty="0"/>
+          </a:p>
+        </p:txBody>
+      </p:sp>
     </p:spTree>
     <p:extLst>
       <p:ext uri="{BB962C8B-B14F-4D97-AF65-F5344CB8AC3E}">
@@ -6538,11 +6592,45 @@
         </p:blipFill>
         <p:spPr>
           <a:xfrm>
-            <a:off x="3985694" y="2160588"/>
-            <a:ext cx="1980650" cy="3881437"/>
+            <a:off x="3953796" y="505654"/>
+            <a:ext cx="3053059" cy="5983014"/>
           </a:xfrm>
         </p:spPr>
       </p:pic>
+      <p:sp>
+        <p:nvSpPr>
+          <p:cNvPr id="5" name="TextBox 4"/>
+          <p:cNvSpPr txBox="1"/>
+          <p:nvPr/>
+        </p:nvSpPr>
+        <p:spPr>
+          <a:xfrm>
+            <a:off x="471286" y="6488668"/>
+            <a:ext cx="1163305" cy="369332"/>
+          </a:xfrm>
+          <a:prstGeom prst="rect">
+            <a:avLst/>
+          </a:prstGeom>
+          <a:noFill/>
+        </p:spPr>
+        <p:txBody>
+          <a:bodyPr wrap="square" rtlCol="0">
+            <a:spAutoFit/>
+          </a:bodyPr>
+          <a:lstStyle/>
+          <a:p>
+            <a:r>
+              <a:rPr lang="en-US" dirty="0" smtClean="0"/>
+              <a:t>Slide </a:t>
+            </a:r>
+            <a:r>
+              <a:rPr lang="en-US" dirty="0" smtClean="0"/>
+              <a:t>7</a:t>
+            </a:r>
+            <a:endParaRPr lang="en-US" dirty="0"/>
+          </a:p>
+        </p:txBody>
+      </p:sp>
     </p:spTree>
     <p:extLst>
       <p:ext uri="{BB962C8B-B14F-4D97-AF65-F5344CB8AC3E}">
@@ -6627,11 +6715,45 @@
         </p:blipFill>
         <p:spPr>
           <a:xfrm>
-            <a:off x="3985694" y="2160588"/>
-            <a:ext cx="1980650" cy="3881437"/>
+            <a:off x="4006959" y="606330"/>
+            <a:ext cx="2914836" cy="5712141"/>
           </a:xfrm>
         </p:spPr>
       </p:pic>
+      <p:sp>
+        <p:nvSpPr>
+          <p:cNvPr id="5" name="TextBox 4"/>
+          <p:cNvSpPr txBox="1"/>
+          <p:nvPr/>
+        </p:nvSpPr>
+        <p:spPr>
+          <a:xfrm>
+            <a:off x="471286" y="6488668"/>
+            <a:ext cx="1163305" cy="369332"/>
+          </a:xfrm>
+          <a:prstGeom prst="rect">
+            <a:avLst/>
+          </a:prstGeom>
+          <a:noFill/>
+        </p:spPr>
+        <p:txBody>
+          <a:bodyPr wrap="square" rtlCol="0">
+            <a:spAutoFit/>
+          </a:bodyPr>
+          <a:lstStyle/>
+          <a:p>
+            <a:r>
+              <a:rPr lang="en-US" dirty="0" smtClean="0"/>
+              <a:t>Slide </a:t>
+            </a:r>
+            <a:r>
+              <a:rPr lang="en-US" dirty="0" smtClean="0"/>
+              <a:t>8</a:t>
+            </a:r>
+            <a:endParaRPr lang="en-US" dirty="0"/>
+          </a:p>
+        </p:txBody>
+      </p:sp>
     </p:spTree>
     <p:extLst>
       <p:ext uri="{BB962C8B-B14F-4D97-AF65-F5344CB8AC3E}">
@@ -6903,7 +7025,7 @@
   <a:extraClrSchemeLst/>
   <a:extLst>
     <a:ext uri="{05A4C25C-085E-4340-85A3-A5531E510DB2}">
-      <thm15:themeFamily xmlns:thm15="http://schemas.microsoft.com/office/thememl/2012/main" name="Facet" id="{C0C680CD-088A-49FC-A102-D699147F32B2}" vid="{CFBC31BA-B70F-4F30-BCAA-4F3011E16C4D}"/>
+      <thm15:themeFamily xmlns:thm15="http://schemas.microsoft.com/office/thememl/2012/main" xmlns="" name="Facet" id="{C0C680CD-088A-49FC-A102-D699147F32B2}" vid="{CFBC31BA-B70F-4F30-BCAA-4F3011E16C4D}"/>
     </a:ext>
   </a:extLst>
 </a:theme>

</xml_diff>